<commit_message>
modified powerpoint + user persona pics
</commit_message>
<xml_diff>
--- a/docs/BASIC_PRESENTATION.pptx
+++ b/docs/BASIC_PRESENTATION.pptx
@@ -110,6 +110,22 @@
       </a:defRPr>
     </a:lvl9pPr>
   </p:defaultTextStyle>
+  <p:extLst>
+    <p:ext uri="{EFAFB233-063F-42B5-8137-9DF3F51BA10A}">
+      <p15:sldGuideLst xmlns:p15="http://schemas.microsoft.com/office/powerpoint/2012/main">
+        <p15:guide id="1" orient="horz" pos="2160">
+          <p15:clr>
+            <a:srgbClr val="A4A3A4"/>
+          </p15:clr>
+        </p15:guide>
+        <p15:guide id="2" pos="2880">
+          <p15:clr>
+            <a:srgbClr val="A4A3A4"/>
+          </p15:clr>
+        </p15:guide>
+      </p15:sldGuideLst>
+    </p:ext>
+  </p:extLst>
 </p:presentation>
 </file>
 
@@ -3751,16 +3767,12 @@
           <a:lstStyle/>
           <a:p>
             <a:r>
+              <a:rPr lang="en-GB" smtClean="0"/>
+              <a:t>N-Tier </a:t>
+            </a:r>
+            <a:r>
               <a:rPr lang="en-GB" dirty="0" smtClean="0"/>
-              <a:t>N-</a:t>
-            </a:r>
-            <a:r>
-              <a:rPr lang="en-GB" dirty="0" err="1" smtClean="0"/>
-              <a:t>Teir</a:t>
-            </a:r>
-            <a:r>
-              <a:rPr lang="en-GB" dirty="0" smtClean="0"/>
-              <a:t> Diagram</a:t>
+              <a:t>Diagram</a:t>
             </a:r>
             <a:endParaRPr lang="en-GB" dirty="0"/>
           </a:p>

</xml_diff>